<commit_message>
Modified code for algorithm
</commit_message>
<xml_diff>
--- a/Antenna Positioning System Project Presentation.pptx
+++ b/Antenna Positioning System Project Presentation.pptx
@@ -8042,7 +8042,7 @@
         <p14:flip dir="l"/>
       </p:transition>
     </mc:Choice>
-    <mc:Fallback xmlns="" xmlns:mv="urn:schemas-microsoft-com:mac:vml" xmlns:c="http://schemas.openxmlformats.org/drawingml/2006/chart" xmlns:dgm="http://schemas.openxmlformats.org/drawingml/2006/diagram" xmlns:o="urn:schemas-microsoft-com:office:office" xmlns:v="urn:schemas-microsoft-com:vml" xmlns:pvml="urn:schemas-microsoft-com:office:powerpoint" xmlns:com="http://schemas.openxmlformats.org/drawingml/2006/compatibility" xmlns:p15="http://schemas.microsoft.com/office/powerpoint/2012/main" xmlns:ahyp="http://schemas.microsoft.com/office/drawing/2018/hyperlinkcolor">
+    <mc:Fallback xmlns:ahyp="http://schemas.microsoft.com/office/drawing/2018/hyperlinkcolor" xmlns:p15="http://schemas.microsoft.com/office/powerpoint/2012/main" xmlns:com="http://schemas.openxmlformats.org/drawingml/2006/compatibility" xmlns:pvml="urn:schemas-microsoft-com:office:powerpoint" xmlns:v="urn:schemas-microsoft-com:vml" xmlns:o="urn:schemas-microsoft-com:office:office" xmlns:dgm="http://schemas.openxmlformats.org/drawingml/2006/diagram" xmlns:c="http://schemas.openxmlformats.org/drawingml/2006/chart" xmlns:mv="urn:schemas-microsoft-com:mac:vml" xmlns="">
       <p:transition spd="slow">
         <p:fade/>
       </p:transition>
@@ -13224,10 +13224,13 @@
         <p:grpSpPr>
           <a:xfrm>
             <a:off x="2622232" y="961072"/>
-            <a:ext cx="7162771" cy="4935860"/>
+            <a:ext cx="6961246" cy="4935860"/>
             <a:chOff x="0" y="0"/>
-            <a:chExt cx="7162815" cy="4936435"/>
+            <a:chExt cx="6961289" cy="4936435"/>
           </a:xfrm>
+          <a:solidFill>
+            <a:srgbClr val="00B050"/>
+          </a:solidFill>
         </p:grpSpPr>
         <p:sp>
           <p:nvSpPr>
@@ -13353,6 +13356,7 @@
                 </a:path>
               </a:pathLst>
             </a:custGeom>
+            <a:grpFill/>
             <a:ln w="9142" cap="flat">
               <a:miter lim="100000"/>
             </a:ln>
@@ -13399,6 +13403,7 @@
             <a:prstGeom prst="rect">
               <a:avLst/>
             </a:prstGeom>
+            <a:grpFill/>
             <a:ln>
               <a:noFill/>
             </a:ln>
@@ -13421,7 +13426,7 @@
                 </a:spcAft>
               </a:pPr>
               <a:r>
-                <a:rPr lang="en-US" sz="850">
+                <a:rPr lang="en-US" sz="850" dirty="0">
                   <a:solidFill>
                     <a:srgbClr val="000000"/>
                   </a:solidFill>
@@ -13431,7 +13436,7 @@
                 </a:rPr>
                 <a:t>UE1</a:t>
               </a:r>
-              <a:endParaRPr lang="en-US" sz="1100">
+              <a:endParaRPr lang="en-US" sz="1100" dirty="0">
                 <a:solidFill>
                   <a:srgbClr val="000000"/>
                 </a:solidFill>
@@ -13566,6 +13571,7 @@
                 </a:path>
               </a:pathLst>
             </a:custGeom>
+            <a:grpFill/>
             <a:ln w="9142" cap="flat">
               <a:miter lim="100000"/>
             </a:ln>
@@ -13612,6 +13618,7 @@
             <a:prstGeom prst="rect">
               <a:avLst/>
             </a:prstGeom>
+            <a:grpFill/>
             <a:ln>
               <a:noFill/>
             </a:ln>
@@ -13779,6 +13786,7 @@
                 </a:path>
               </a:pathLst>
             </a:custGeom>
+            <a:grpFill/>
             <a:ln w="9142" cap="flat">
               <a:miter lim="100000"/>
             </a:ln>
@@ -13825,6 +13833,7 @@
             <a:prstGeom prst="rect">
               <a:avLst/>
             </a:prstGeom>
+            <a:grpFill/>
             <a:ln>
               <a:noFill/>
             </a:ln>
@@ -13847,7 +13856,7 @@
                 </a:spcAft>
               </a:pPr>
               <a:r>
-                <a:rPr lang="en-US" sz="850">
+                <a:rPr lang="en-US" sz="850" dirty="0">
                   <a:solidFill>
                     <a:srgbClr val="000000"/>
                   </a:solidFill>
@@ -13857,7 +13866,7 @@
                 </a:rPr>
                 <a:t> UE2</a:t>
               </a:r>
-              <a:endParaRPr lang="en-US" sz="1100">
+              <a:endParaRPr lang="en-US" sz="1100" dirty="0">
                 <a:solidFill>
                   <a:srgbClr val="000000"/>
                 </a:solidFill>
@@ -13992,6 +14001,7 @@
                 </a:path>
               </a:pathLst>
             </a:custGeom>
+            <a:grpFill/>
             <a:ln w="9142" cap="flat">
               <a:miter lim="100000"/>
             </a:ln>
@@ -14038,6 +14048,7 @@
             <a:prstGeom prst="rect">
               <a:avLst/>
             </a:prstGeom>
+            <a:grpFill/>
             <a:ln>
               <a:noFill/>
             </a:ln>
@@ -14143,6 +14154,7 @@
                 </a:path>
               </a:pathLst>
             </a:custGeom>
+            <a:grpFill/>
             <a:ln w="9142" cap="flat">
               <a:miter lim="127000"/>
             </a:ln>
@@ -14189,6 +14201,7 @@
             <a:prstGeom prst="rect">
               <a:avLst/>
             </a:prstGeom>
+            <a:grpFill/>
             <a:ln>
               <a:noFill/>
             </a:ln>
@@ -14252,6 +14265,7 @@
             <a:prstGeom prst="rect">
               <a:avLst/>
             </a:prstGeom>
+            <a:grpFill/>
             <a:ln>
               <a:noFill/>
             </a:ln>
@@ -14315,6 +14329,7 @@
             <a:prstGeom prst="rect">
               <a:avLst/>
             </a:prstGeom>
+            <a:grpFill/>
             <a:ln>
               <a:noFill/>
             </a:ln>
@@ -14378,6 +14393,7 @@
             <a:prstGeom prst="rect">
               <a:avLst/>
             </a:prstGeom>
+            <a:grpFill/>
             <a:ln>
               <a:noFill/>
             </a:ln>
@@ -14400,7 +14416,7 @@
                 </a:spcAft>
               </a:pPr>
               <a:r>
-                <a:rPr lang="en-US" sz="850">
+                <a:rPr lang="en-US" sz="850" dirty="0">
                   <a:solidFill>
                     <a:srgbClr val="000000"/>
                   </a:solidFill>
@@ -14410,7 +14426,7 @@
                 </a:rPr>
                 <a:t>Cloud Server</a:t>
               </a:r>
-              <a:endParaRPr lang="en-US" sz="1100">
+              <a:endParaRPr lang="en-US" sz="1100" dirty="0">
                 <a:solidFill>
                   <a:srgbClr val="000000"/>
                 </a:solidFill>
@@ -14441,6 +14457,7 @@
             <a:prstGeom prst="rect">
               <a:avLst/>
             </a:prstGeom>
+            <a:grpFill/>
             <a:ln>
               <a:noFill/>
             </a:ln>
@@ -14688,6 +14705,7 @@
                 </a:path>
               </a:pathLst>
             </a:custGeom>
+            <a:grpFill/>
             <a:ln w="9142" cap="flat">
               <a:miter lim="100000"/>
             </a:ln>
@@ -14734,6 +14752,7 @@
             <a:prstGeom prst="rect">
               <a:avLst/>
             </a:prstGeom>
+            <a:grpFill/>
             <a:ln>
               <a:noFill/>
             </a:ln>
@@ -14797,6 +14816,7 @@
             <a:prstGeom prst="rect">
               <a:avLst/>
             </a:prstGeom>
+            <a:grpFill/>
             <a:ln>
               <a:noFill/>
             </a:ln>
@@ -14860,6 +14880,7 @@
             <a:prstGeom prst="rect">
               <a:avLst/>
             </a:prstGeom>
+            <a:grpFill/>
             <a:ln>
               <a:noFill/>
             </a:ln>
@@ -14882,7 +14903,7 @@
                 </a:spcAft>
               </a:pPr>
               <a:r>
-                <a:rPr lang="en-US" sz="850">
+                <a:rPr lang="en-US" sz="850" dirty="0">
                   <a:solidFill>
                     <a:srgbClr val="000000"/>
                   </a:solidFill>
@@ -14892,7 +14913,7 @@
                 </a:rPr>
                 <a:t>Nvidia Jetson AGX </a:t>
               </a:r>
-              <a:endParaRPr lang="en-US" sz="1100">
+              <a:endParaRPr lang="en-US" sz="1100" dirty="0">
                 <a:solidFill>
                   <a:srgbClr val="000000"/>
                 </a:solidFill>
@@ -14923,6 +14944,7 @@
             <a:prstGeom prst="rect">
               <a:avLst/>
             </a:prstGeom>
+            <a:grpFill/>
             <a:ln>
               <a:noFill/>
             </a:ln>
@@ -14986,6 +15008,7 @@
             <a:prstGeom prst="rect">
               <a:avLst/>
             </a:prstGeom>
+            <a:grpFill/>
             <a:ln>
               <a:noFill/>
             </a:ln>
@@ -15073,6 +15096,7 @@
                 </a:path>
               </a:pathLst>
             </a:custGeom>
+            <a:grpFill/>
             <a:ln w="9142" cap="flat">
               <a:miter lim="127000"/>
             </a:ln>
@@ -15119,6 +15143,7 @@
             <a:prstGeom prst="rect">
               <a:avLst/>
             </a:prstGeom>
+            <a:grpFill/>
             <a:ln>
               <a:noFill/>
             </a:ln>
@@ -15182,6 +15207,7 @@
             <a:prstGeom prst="rect">
               <a:avLst/>
             </a:prstGeom>
+            <a:grpFill/>
             <a:ln>
               <a:noFill/>
             </a:ln>
@@ -15245,6 +15271,7 @@
             <a:prstGeom prst="rect">
               <a:avLst/>
             </a:prstGeom>
+            <a:grpFill/>
             <a:ln>
               <a:noFill/>
             </a:ln>
@@ -15308,6 +15335,7 @@
             <a:prstGeom prst="rect">
               <a:avLst/>
             </a:prstGeom>
+            <a:grpFill/>
             <a:ln>
               <a:noFill/>
             </a:ln>
@@ -15371,6 +15399,7 @@
             <a:prstGeom prst="rect">
               <a:avLst/>
             </a:prstGeom>
+            <a:grpFill/>
             <a:ln>
               <a:noFill/>
             </a:ln>
@@ -15618,6 +15647,7 @@
                 </a:path>
               </a:pathLst>
             </a:custGeom>
+            <a:grpFill/>
             <a:ln w="9142" cap="flat">
               <a:miter lim="100000"/>
             </a:ln>
@@ -15664,6 +15694,7 @@
             <a:prstGeom prst="rect">
               <a:avLst/>
             </a:prstGeom>
+            <a:grpFill/>
             <a:ln>
               <a:noFill/>
             </a:ln>
@@ -15911,6 +15942,7 @@
                 </a:path>
               </a:pathLst>
             </a:custGeom>
+            <a:grpFill/>
             <a:ln w="9142" cap="flat">
               <a:miter lim="100000"/>
             </a:ln>
@@ -15957,6 +15989,7 @@
             <a:prstGeom prst="rect">
               <a:avLst/>
             </a:prstGeom>
+            <a:grpFill/>
             <a:ln>
               <a:noFill/>
             </a:ln>
@@ -15979,7 +16012,7 @@
                 </a:spcAft>
               </a:pPr>
               <a:r>
-                <a:rPr lang="en-US" sz="850">
+                <a:rPr lang="en-US" sz="850" dirty="0">
                   <a:solidFill>
                     <a:srgbClr val="000000"/>
                   </a:solidFill>
@@ -15989,7 +16022,7 @@
                 </a:rPr>
                 <a:t>Motor Driver</a:t>
               </a:r>
-              <a:endParaRPr lang="en-US" sz="1100">
+              <a:endParaRPr lang="en-US" sz="1100" dirty="0">
                 <a:solidFill>
                   <a:srgbClr val="000000"/>
                 </a:solidFill>
@@ -16204,6 +16237,7 @@
                 </a:path>
               </a:pathLst>
             </a:custGeom>
+            <a:grpFill/>
             <a:ln w="9142" cap="flat">
               <a:miter lim="100000"/>
             </a:ln>
@@ -16250,6 +16284,7 @@
             <a:prstGeom prst="rect">
               <a:avLst/>
             </a:prstGeom>
+            <a:grpFill/>
             <a:ln>
               <a:noFill/>
             </a:ln>
@@ -16272,7 +16307,7 @@
                 </a:spcAft>
               </a:pPr>
               <a:r>
-                <a:rPr lang="en-US" sz="850">
+                <a:rPr lang="en-US" sz="850" dirty="0">
                   <a:solidFill>
                     <a:srgbClr val="000000"/>
                   </a:solidFill>
@@ -16282,7 +16317,7 @@
                 </a:rPr>
                 <a:t>Microcontroller</a:t>
               </a:r>
-              <a:endParaRPr lang="en-US" sz="1100">
+              <a:endParaRPr lang="en-US" sz="1100" dirty="0">
                 <a:solidFill>
                   <a:srgbClr val="000000"/>
                 </a:solidFill>
@@ -16313,6 +16348,7 @@
             <a:prstGeom prst="rect">
               <a:avLst/>
             </a:prstGeom>
+            <a:grpFill/>
             <a:ln>
               <a:noFill/>
             </a:ln>
@@ -16376,6 +16412,7 @@
             <a:prstGeom prst="rect">
               <a:avLst/>
             </a:prstGeom>
+            <a:grpFill/>
             <a:ln>
               <a:noFill/>
             </a:ln>
@@ -16439,6 +16476,7 @@
             <a:prstGeom prst="rect">
               <a:avLst/>
             </a:prstGeom>
+            <a:grpFill/>
             <a:ln>
               <a:noFill/>
             </a:ln>
@@ -16502,6 +16540,7 @@
             <a:prstGeom prst="rect">
               <a:avLst/>
             </a:prstGeom>
+            <a:grpFill/>
             <a:ln>
               <a:noFill/>
             </a:ln>
@@ -16579,6 +16618,7 @@
                 </a:path>
               </a:pathLst>
             </a:custGeom>
+            <a:grpFill/>
             <a:ln w="9142" cap="flat">
               <a:miter lim="127000"/>
             </a:ln>
@@ -16649,6 +16689,7 @@
                 </a:path>
               </a:pathLst>
             </a:custGeom>
+            <a:grpFill/>
             <a:ln w="0" cap="flat">
               <a:miter lim="127000"/>
             </a:ln>
@@ -16719,6 +16760,7 @@
                 </a:path>
               </a:pathLst>
             </a:custGeom>
+            <a:grpFill/>
             <a:ln w="9142" cap="flat">
               <a:miter lim="127000"/>
             </a:ln>
@@ -16779,6 +16821,7 @@
                 </a:path>
               </a:pathLst>
             </a:custGeom>
+            <a:grpFill/>
             <a:ln w="9142" cap="flat">
               <a:miter lim="127000"/>
             </a:ln>
@@ -16849,6 +16892,7 @@
                 </a:path>
               </a:pathLst>
             </a:custGeom>
+            <a:grpFill/>
             <a:ln w="0" cap="flat">
               <a:miter lim="127000"/>
             </a:ln>
@@ -16919,6 +16963,7 @@
                 </a:path>
               </a:pathLst>
             </a:custGeom>
+            <a:grpFill/>
             <a:ln w="9142" cap="flat">
               <a:miter lim="127000"/>
             </a:ln>
@@ -16979,6 +17024,7 @@
                 </a:path>
               </a:pathLst>
             </a:custGeom>
+            <a:grpFill/>
             <a:ln w="9142" cap="flat">
               <a:miter lim="127000"/>
             </a:ln>
@@ -17049,6 +17095,7 @@
                 </a:path>
               </a:pathLst>
             </a:custGeom>
+            <a:grpFill/>
             <a:ln w="0" cap="flat">
               <a:miter lim="127000"/>
             </a:ln>
@@ -17119,6 +17166,7 @@
                 </a:path>
               </a:pathLst>
             </a:custGeom>
+            <a:grpFill/>
             <a:ln w="9142" cap="flat">
               <a:miter lim="127000"/>
             </a:ln>
@@ -17179,6 +17227,7 @@
                 </a:path>
               </a:pathLst>
             </a:custGeom>
+            <a:grpFill/>
             <a:ln w="9142" cap="flat">
               <a:miter lim="127000"/>
             </a:ln>
@@ -17249,6 +17298,7 @@
                 </a:path>
               </a:pathLst>
             </a:custGeom>
+            <a:grpFill/>
             <a:ln w="0" cap="flat">
               <a:miter lim="127000"/>
             </a:ln>
@@ -17319,6 +17369,7 @@
                 </a:path>
               </a:pathLst>
             </a:custGeom>
+            <a:grpFill/>
             <a:ln w="9142" cap="flat">
               <a:miter lim="127000"/>
             </a:ln>
@@ -17379,6 +17430,7 @@
                 </a:path>
               </a:pathLst>
             </a:custGeom>
+            <a:grpFill/>
             <a:ln w="9142" cap="flat">
               <a:miter lim="127000"/>
             </a:ln>
@@ -17449,6 +17501,7 @@
                 </a:path>
               </a:pathLst>
             </a:custGeom>
+            <a:grpFill/>
             <a:ln w="0" cap="flat">
               <a:miter lim="127000"/>
             </a:ln>
@@ -17519,6 +17572,7 @@
                 </a:path>
               </a:pathLst>
             </a:custGeom>
+            <a:grpFill/>
             <a:ln w="9142" cap="flat">
               <a:miter lim="127000"/>
             </a:ln>
@@ -17589,6 +17643,7 @@
                 </a:path>
               </a:pathLst>
             </a:custGeom>
+            <a:grpFill/>
             <a:ln w="0" cap="flat">
               <a:miter lim="127000"/>
             </a:ln>
@@ -17659,6 +17714,7 @@
                 </a:path>
               </a:pathLst>
             </a:custGeom>
+            <a:grpFill/>
             <a:ln w="9142" cap="flat">
               <a:miter lim="127000"/>
             </a:ln>
@@ -17719,6 +17775,7 @@
                 </a:path>
               </a:pathLst>
             </a:custGeom>
+            <a:grpFill/>
             <a:ln w="9142" cap="flat">
               <a:miter lim="127000"/>
             </a:ln>
@@ -17789,6 +17846,7 @@
                 </a:path>
               </a:pathLst>
             </a:custGeom>
+            <a:grpFill/>
             <a:ln w="0" cap="flat">
               <a:miter lim="127000"/>
             </a:ln>
@@ -17859,6 +17917,7 @@
                 </a:path>
               </a:pathLst>
             </a:custGeom>
+            <a:grpFill/>
             <a:ln w="9142" cap="flat">
               <a:miter lim="127000"/>
             </a:ln>
@@ -17919,6 +17978,7 @@
                 </a:path>
               </a:pathLst>
             </a:custGeom>
+            <a:grpFill/>
             <a:ln w="9142" cap="flat">
               <a:miter lim="127000"/>
             </a:ln>
@@ -17989,6 +18049,7 @@
                 </a:path>
               </a:pathLst>
             </a:custGeom>
+            <a:grpFill/>
             <a:ln w="0" cap="flat">
               <a:miter lim="127000"/>
             </a:ln>
@@ -18059,6 +18120,7 @@
                 </a:path>
               </a:pathLst>
             </a:custGeom>
+            <a:grpFill/>
             <a:ln w="9142" cap="flat">
               <a:miter lim="127000"/>
             </a:ln>
@@ -18119,6 +18181,7 @@
                 </a:path>
               </a:pathLst>
             </a:custGeom>
+            <a:grpFill/>
             <a:ln w="9142" cap="flat">
               <a:miter lim="127000"/>
             </a:ln>
@@ -18189,6 +18252,7 @@
                 </a:path>
               </a:pathLst>
             </a:custGeom>
+            <a:grpFill/>
             <a:ln w="0" cap="flat">
               <a:miter lim="127000"/>
             </a:ln>
@@ -18259,6 +18323,7 @@
                 </a:path>
               </a:pathLst>
             </a:custGeom>
+            <a:grpFill/>
             <a:ln w="9142" cap="flat">
               <a:miter lim="127000"/>
             </a:ln>
@@ -18319,6 +18384,7 @@
                 </a:path>
               </a:pathLst>
             </a:custGeom>
+            <a:grpFill/>
             <a:ln w="9142" cap="flat">
               <a:miter lim="127000"/>
             </a:ln>
@@ -18389,6 +18455,7 @@
                 </a:path>
               </a:pathLst>
             </a:custGeom>
+            <a:grpFill/>
             <a:ln w="0" cap="flat">
               <a:miter lim="127000"/>
             </a:ln>
@@ -18459,6 +18526,7 @@
                 </a:path>
               </a:pathLst>
             </a:custGeom>
+            <a:grpFill/>
             <a:ln w="9142" cap="flat">
               <a:miter lim="127000"/>
             </a:ln>
@@ -18689,6 +18757,7 @@
                 </a:path>
               </a:pathLst>
             </a:custGeom>
+            <a:grpFill/>
             <a:ln w="9142" cap="flat">
               <a:miter lim="100000"/>
             </a:ln>
@@ -18735,6 +18804,7 @@
             <a:prstGeom prst="rect">
               <a:avLst/>
             </a:prstGeom>
+            <a:grpFill/>
             <a:ln>
               <a:noFill/>
             </a:ln>
@@ -18812,6 +18882,7 @@
                 </a:path>
               </a:pathLst>
             </a:custGeom>
+            <a:grpFill/>
             <a:ln w="9142" cap="flat">
               <a:miter lim="127000"/>
             </a:ln>
@@ -18882,6 +18953,7 @@
                 </a:path>
               </a:pathLst>
             </a:custGeom>
+            <a:grpFill/>
             <a:ln w="0" cap="flat">
               <a:miter lim="127000"/>
             </a:ln>
@@ -18952,6 +19024,7 @@
                 </a:path>
               </a:pathLst>
             </a:custGeom>
+            <a:grpFill/>
             <a:ln w="9142" cap="flat">
               <a:miter lim="127000"/>
             </a:ln>
@@ -19019,6 +19092,7 @@
                 </a:path>
               </a:pathLst>
             </a:custGeom>
+            <a:grpFill/>
             <a:ln w="9142" cap="flat">
               <a:miter lim="100000"/>
             </a:ln>
@@ -19065,6 +19139,7 @@
             <a:prstGeom prst="rect">
               <a:avLst/>
             </a:prstGeom>
+            <a:grpFill/>
             <a:ln>
               <a:noFill/>
             </a:ln>
@@ -19128,6 +19203,7 @@
             <a:prstGeom prst="rect">
               <a:avLst/>
             </a:prstGeom>
+            <a:grpFill/>
             <a:ln>
               <a:noFill/>
             </a:ln>
@@ -19185,12 +19261,13 @@
           </p:nvSpPr>
           <p:spPr>
             <a:xfrm>
-              <a:off x="5590055" y="4349214"/>
-              <a:ext cx="1543196" cy="137136"/>
+              <a:off x="5590055" y="4383632"/>
+              <a:ext cx="1371232" cy="102718"/>
             </a:xfrm>
             <a:prstGeom prst="rect">
               <a:avLst/>
             </a:prstGeom>
+            <a:grpFill/>
             <a:ln>
               <a:noFill/>
             </a:ln>
@@ -19254,6 +19331,7 @@
             <a:prstGeom prst="rect">
               <a:avLst/>
             </a:prstGeom>
+            <a:grpFill/>
             <a:ln>
               <a:noFill/>
             </a:ln>
@@ -19317,6 +19395,7 @@
             <a:prstGeom prst="rect">
               <a:avLst/>
             </a:prstGeom>
+            <a:grpFill/>
             <a:ln>
               <a:noFill/>
             </a:ln>
@@ -19380,6 +19459,7 @@
             <a:prstGeom prst="rect">
               <a:avLst/>
             </a:prstGeom>
+            <a:grpFill/>
             <a:ln>
               <a:noFill/>
             </a:ln>
@@ -19437,12 +19517,13 @@
           </p:nvSpPr>
           <p:spPr>
             <a:xfrm>
-              <a:off x="5590055" y="4614319"/>
-              <a:ext cx="1572760" cy="137136"/>
+              <a:off x="5590055" y="4630451"/>
+              <a:ext cx="1371232" cy="121003"/>
             </a:xfrm>
             <a:prstGeom prst="rect">
               <a:avLst/>
             </a:prstGeom>
+            <a:grpFill/>
             <a:ln>
               <a:noFill/>
             </a:ln>
@@ -19506,6 +19587,7 @@
             <a:prstGeom prst="rect">
               <a:avLst/>
             </a:prstGeom>
+            <a:grpFill/>
             <a:ln>
               <a:noFill/>
             </a:ln>
@@ -19569,6 +19651,7 @@
             <a:prstGeom prst="rect">
               <a:avLst/>
             </a:prstGeom>
+            <a:grpFill/>
             <a:ln>
               <a:noFill/>
             </a:ln>
@@ -19632,6 +19715,7 @@
             <a:prstGeom prst="rect">
               <a:avLst/>
             </a:prstGeom>
+            <a:grpFill/>
             <a:ln>
               <a:noFill/>
             </a:ln>
@@ -19689,12 +19773,13 @@
           </p:nvSpPr>
           <p:spPr>
             <a:xfrm>
-              <a:off x="5833877" y="4742301"/>
-              <a:ext cx="1265005" cy="137136"/>
+              <a:off x="5590055" y="4742300"/>
+              <a:ext cx="1371234" cy="194135"/>
             </a:xfrm>
             <a:prstGeom prst="rect">
               <a:avLst/>
             </a:prstGeom>
+            <a:grpFill/>
             <a:ln>
               <a:noFill/>
             </a:ln>

</xml_diff>